<commit_message>
Seems powerpoint didn't save what it should have
</commit_message>
<xml_diff>
--- a/2016-10-27 - SkiaSharp/SkiaSharp.pptx
+++ b/2016-10-27 - SkiaSharp/SkiaSharp.pptx
@@ -5,7 +5,7 @@
     <p:sldMasterId id="2147483648" r:id="rId1"/>
   </p:sldMasterIdLst>
   <p:notesMasterIdLst>
-    <p:notesMasterId r:id="rId17"/>
+    <p:notesMasterId r:id="rId19"/>
   </p:notesMasterIdLst>
   <p:sldIdLst>
     <p:sldId id="256" r:id="rId2"/>
@@ -20,9 +20,11 @@
     <p:sldId id="339" r:id="rId11"/>
     <p:sldId id="340" r:id="rId12"/>
     <p:sldId id="335" r:id="rId13"/>
-    <p:sldId id="336" r:id="rId14"/>
-    <p:sldId id="332" r:id="rId15"/>
-    <p:sldId id="327" r:id="rId16"/>
+    <p:sldId id="342" r:id="rId14"/>
+    <p:sldId id="336" r:id="rId15"/>
+    <p:sldId id="343" r:id="rId16"/>
+    <p:sldId id="332" r:id="rId17"/>
+    <p:sldId id="327" r:id="rId18"/>
   </p:sldIdLst>
   <p:sldSz cx="9144000" cy="5143500" type="screen16x9"/>
   <p:notesSz cx="6858000" cy="9144000"/>
@@ -448,6 +450,155 @@
     </p:spTree>
     <p:extLst>
       <p:ext uri="{BB962C8B-B14F-4D97-AF65-F5344CB8AC3E}">
+        <p14:creationId xmlns:p14="http://schemas.microsoft.com/office/powerpoint/2010/main" val="637180009"/>
+      </p:ext>
+    </p:extLst>
+  </p:cSld>
+  <p:clrMapOvr>
+    <a:masterClrMapping/>
+  </p:clrMapOvr>
+</p:notes>
+</file>
+
+<file path=ppt/notesSlides/notesSlide11.xml><?xml version="1.0" encoding="utf-8"?>
+<p:notes xmlns:a="http://schemas.openxmlformats.org/drawingml/2006/main" xmlns:r="http://schemas.openxmlformats.org/officeDocument/2006/relationships" xmlns:p="http://schemas.openxmlformats.org/presentationml/2006/main">
+  <p:cSld>
+    <p:spTree>
+      <p:nvGrpSpPr>
+        <p:cNvPr id="1" name=""/>
+        <p:cNvGrpSpPr/>
+        <p:nvPr/>
+      </p:nvGrpSpPr>
+      <p:grpSpPr>
+        <a:xfrm>
+          <a:off x="0" y="0"/>
+          <a:ext cx="0" cy="0"/>
+          <a:chOff x="0" y="0"/>
+          <a:chExt cx="0" cy="0"/>
+        </a:xfrm>
+      </p:grpSpPr>
+      <p:sp>
+        <p:nvSpPr>
+          <p:cNvPr id="2" name="Slide Image Placeholder 1"/>
+          <p:cNvSpPr>
+            <a:spLocks noGrp="1" noRot="1" noChangeAspect="1"/>
+          </p:cNvSpPr>
+          <p:nvPr>
+            <p:ph type="sldImg"/>
+          </p:nvPr>
+        </p:nvSpPr>
+        <p:spPr>
+          <a:xfrm>
+            <a:off x="381000" y="685800"/>
+            <a:ext cx="6096000" cy="3429000"/>
+          </a:xfrm>
+        </p:spPr>
+      </p:sp>
+      <p:sp>
+        <p:nvSpPr>
+          <p:cNvPr id="3" name="Notes Placeholder 2"/>
+          <p:cNvSpPr>
+            <a:spLocks noGrp="1"/>
+          </p:cNvSpPr>
+          <p:nvPr>
+            <p:ph type="body" idx="1"/>
+          </p:nvPr>
+        </p:nvSpPr>
+        <p:spPr/>
+        <p:txBody>
+          <a:bodyPr/>
+          <a:lstStyle/>
+          <a:p>
+            <a:endParaRPr lang="en-US" dirty="0"/>
+          </a:p>
+        </p:txBody>
+      </p:sp>
+    </p:spTree>
+    <p:extLst>
+      <p:ext uri="{BB962C8B-B14F-4D97-AF65-F5344CB8AC3E}">
+        <p14:creationId xmlns:p14="http://schemas.microsoft.com/office/powerpoint/2010/main" val="4188326692"/>
+      </p:ext>
+    </p:extLst>
+  </p:cSld>
+  <p:clrMapOvr>
+    <a:masterClrMapping/>
+  </p:clrMapOvr>
+</p:notes>
+</file>
+
+<file path=ppt/notesSlides/notesSlide12.xml><?xml version="1.0" encoding="utf-8"?>
+<p:notes xmlns:a="http://schemas.openxmlformats.org/drawingml/2006/main" xmlns:r="http://schemas.openxmlformats.org/officeDocument/2006/relationships" xmlns:p="http://schemas.openxmlformats.org/presentationml/2006/main">
+  <p:cSld>
+    <p:spTree>
+      <p:nvGrpSpPr>
+        <p:cNvPr id="1" name=""/>
+        <p:cNvGrpSpPr/>
+        <p:nvPr/>
+      </p:nvGrpSpPr>
+      <p:grpSpPr>
+        <a:xfrm>
+          <a:off x="0" y="0"/>
+          <a:ext cx="0" cy="0"/>
+          <a:chOff x="0" y="0"/>
+          <a:chExt cx="0" cy="0"/>
+        </a:xfrm>
+      </p:grpSpPr>
+      <p:sp>
+        <p:nvSpPr>
+          <p:cNvPr id="2" name="Slide Image Placeholder 1"/>
+          <p:cNvSpPr>
+            <a:spLocks noGrp="1" noRot="1" noChangeAspect="1"/>
+          </p:cNvSpPr>
+          <p:nvPr>
+            <p:ph type="sldImg"/>
+          </p:nvPr>
+        </p:nvSpPr>
+        <p:spPr>
+          <a:xfrm>
+            <a:off x="381000" y="685800"/>
+            <a:ext cx="6096000" cy="3429000"/>
+          </a:xfrm>
+        </p:spPr>
+      </p:sp>
+      <p:sp>
+        <p:nvSpPr>
+          <p:cNvPr id="3" name="Notes Placeholder 2"/>
+          <p:cNvSpPr>
+            <a:spLocks noGrp="1"/>
+          </p:cNvSpPr>
+          <p:nvPr>
+            <p:ph type="body" idx="1"/>
+          </p:nvPr>
+        </p:nvSpPr>
+        <p:spPr/>
+        <p:txBody>
+          <a:bodyPr/>
+          <a:lstStyle/>
+          <a:p>
+            <a:pPr marL="0" marR="0" indent="0" defTabSz="457200" eaLnBrk="1" fontAlgn="auto" latinLnBrk="0" hangingPunct="1">
+              <a:lnSpc>
+                <a:spcPct val="125000"/>
+              </a:lnSpc>
+              <a:spcBef>
+                <a:spcPts val="0"/>
+              </a:spcBef>
+              <a:spcAft>
+                <a:spcPts val="0"/>
+              </a:spcAft>
+              <a:buClrTx/>
+              <a:buSzTx/>
+              <a:buFontTx/>
+              <a:buNone/>
+              <a:tabLst/>
+              <a:defRPr/>
+            </a:pPr>
+            <a:endParaRPr lang="en-ZA" dirty="0"/>
+          </a:p>
+        </p:txBody>
+      </p:sp>
+    </p:spTree>
+    <p:extLst>
+      <p:ext uri="{BB962C8B-B14F-4D97-AF65-F5344CB8AC3E}">
         <p14:creationId xmlns:p14="http://schemas.microsoft.com/office/powerpoint/2010/main" val="769763903"/>
       </p:ext>
     </p:extLst>
@@ -1597,14 +1748,31 @@
           <a:bodyPr/>
           <a:lstStyle/>
           <a:p>
-            <a:endParaRPr lang="en-US" dirty="0"/>
+            <a:pPr marL="0" marR="0" indent="0" defTabSz="457200" eaLnBrk="1" fontAlgn="auto" latinLnBrk="0" hangingPunct="1">
+              <a:lnSpc>
+                <a:spcPct val="125000"/>
+              </a:lnSpc>
+              <a:spcBef>
+                <a:spcPts val="0"/>
+              </a:spcBef>
+              <a:spcAft>
+                <a:spcPts val="0"/>
+              </a:spcAft>
+              <a:buClrTx/>
+              <a:buSzTx/>
+              <a:buFontTx/>
+              <a:buNone/>
+              <a:tabLst/>
+              <a:defRPr/>
+            </a:pPr>
+            <a:endParaRPr lang="en-ZA" dirty="0"/>
           </a:p>
         </p:txBody>
       </p:sp>
     </p:spTree>
     <p:extLst>
       <p:ext uri="{BB962C8B-B14F-4D97-AF65-F5344CB8AC3E}">
-        <p14:creationId xmlns:p14="http://schemas.microsoft.com/office/powerpoint/2010/main" val="4188326692"/>
+        <p14:creationId xmlns:p14="http://schemas.microsoft.com/office/powerpoint/2010/main" val="2764170807"/>
       </p:ext>
     </p:extLst>
   </p:cSld>
@@ -3663,7 +3831,6 @@
               <a:rPr lang="en-ZA" dirty="0"/>
               <a:t>Written in C#</a:t>
             </a:r>
-            <a:endParaRPr lang="en-ZA" dirty="0"/>
           </a:p>
           <a:p>
             <a:r>
@@ -3903,7 +4070,6 @@
               <a:rPr lang="en-ZA" dirty="0"/>
               <a:t>Written C#</a:t>
             </a:r>
-            <a:endParaRPr lang="en-ZA" dirty="0"/>
           </a:p>
           <a:p>
             <a:r>
@@ -4087,6 +4253,33 @@
       </p:grpSpPr>
       <p:sp>
         <p:nvSpPr>
+          <p:cNvPr id="2" name="Title 1"/>
+          <p:cNvSpPr>
+            <a:spLocks noGrp="1"/>
+          </p:cNvSpPr>
+          <p:nvPr>
+            <p:ph type="title"/>
+          </p:nvPr>
+        </p:nvSpPr>
+        <p:spPr/>
+        <p:txBody>
+          <a:bodyPr/>
+          <a:lstStyle/>
+          <a:p>
+            <a:r>
+              <a:rPr lang="en-ZA" dirty="0"/>
+              <a:t>SkiaSharp use </a:t>
+            </a:r>
+            <a:r>
+              <a:rPr lang="en-ZA" dirty="0" err="1"/>
+              <a:t>monodoc</a:t>
+            </a:r>
+            <a:endParaRPr lang="en-ZA" dirty="0"/>
+          </a:p>
+        </p:txBody>
+      </p:sp>
+      <p:sp>
+        <p:nvSpPr>
           <p:cNvPr id="3" name="Text Placeholder 2"/>
           <p:cNvSpPr>
             <a:spLocks noGrp="1"/>
@@ -4095,22 +4288,89 @@
             <p:ph type="body" idx="1"/>
           </p:nvPr>
         </p:nvSpPr>
-        <p:spPr/>
+        <p:spPr>
+          <a:xfrm>
+            <a:off x="252412" y="1352550"/>
+            <a:ext cx="8383588" cy="3790950"/>
+          </a:xfrm>
+        </p:spPr>
         <p:txBody>
           <a:bodyPr/>
           <a:lstStyle/>
           <a:p>
             <a:r>
-              <a:rPr lang="en-US" dirty="0"/>
-              <a:t>Tools Used</a:t>
-            </a:r>
+              <a:rPr lang="en-ZA" dirty="0"/>
+              <a:t>Documentation is separate</a:t>
+            </a:r>
+          </a:p>
+          <a:p>
+            <a:pPr marL="0" lvl="1" indent="0">
+              <a:buNone/>
+            </a:pPr>
+            <a:r>
+              <a:rPr lang="en-ZA" dirty="0"/>
+              <a:t>	– docs not tied to release timetable</a:t>
+            </a:r>
+          </a:p>
+          <a:p>
+            <a:pPr marL="0" lvl="1" indent="0">
+              <a:buNone/>
+            </a:pPr>
+            <a:r>
+              <a:rPr lang="en-ZA" dirty="0"/>
+              <a:t>	– docs do not require code modification</a:t>
+            </a:r>
+          </a:p>
+          <a:p>
+            <a:r>
+              <a:rPr lang="en-ZA" dirty="0"/>
+              <a:t>Stored as XML</a:t>
+            </a:r>
+          </a:p>
+          <a:p>
+            <a:pPr marL="0" lvl="1" indent="0">
+              <a:buNone/>
+            </a:pPr>
+            <a:r>
+              <a:rPr lang="en-ZA" dirty="0"/>
+              <a:t>	– no need to parse code</a:t>
+            </a:r>
+          </a:p>
+          <a:p>
+            <a:pPr marL="0" lvl="1" indent="0">
+              <a:buNone/>
+            </a:pPr>
+            <a:r>
+              <a:rPr lang="en-ZA" dirty="0"/>
+              <a:t>	– processed by simple tools</a:t>
+            </a:r>
+          </a:p>
+          <a:p>
+            <a:pPr marL="0" lvl="1" indent="0">
+              <a:buNone/>
+            </a:pPr>
+            <a:r>
+              <a:rPr lang="en-ZA" dirty="0"/>
+              <a:t>	</a:t>
+            </a:r>
+            <a:r>
+              <a:rPr lang="en-ZA"/>
+              <a:t>– edited by a docs team</a:t>
+            </a:r>
+            <a:endParaRPr lang="en-ZA" dirty="0"/>
+          </a:p>
+          <a:p>
+            <a:pPr marL="0" lvl="1" indent="0">
+              <a:buNone/>
+            </a:pPr>
+            <a:endParaRPr lang="en-ZA" dirty="0"/>
           </a:p>
         </p:txBody>
       </p:sp>
     </p:spTree>
     <p:extLst>
       <p:ext uri="{BB962C8B-B14F-4D97-AF65-F5344CB8AC3E}">
-        <p14:creationId xmlns:p14="http://schemas.microsoft.com/office/powerpoint/2010/main" val="3960602197"/>
+        <p14:creationId xmlns:p14="http://schemas.microsoft.com/office/powerpoint/2010/main" val="1075355559"/>
       </p:ext>
     </p:extLst>
   </p:cSld>
@@ -4157,7 +4417,7 @@
           <a:p>
             <a:r>
               <a:rPr lang="en-US" dirty="0"/>
-              <a:t>Conclusions</a:t>
+              <a:t>Tools Used</a:t>
             </a:r>
           </a:p>
         </p:txBody>
@@ -4165,7 +4425,7 @@
     </p:spTree>
     <p:extLst>
       <p:ext uri="{BB962C8B-B14F-4D97-AF65-F5344CB8AC3E}">
-        <p14:creationId xmlns:p14="http://schemas.microsoft.com/office/powerpoint/2010/main" val="1185255620"/>
+        <p14:creationId xmlns:p14="http://schemas.microsoft.com/office/powerpoint/2010/main" val="3960602197"/>
       </p:ext>
     </p:extLst>
   </p:cSld>
@@ -4212,6 +4472,224 @@
           <a:p>
             <a:r>
               <a:rPr lang="en-ZA" dirty="0"/>
+              <a:t>SkiaSharp is built with open source</a:t>
+            </a:r>
+          </a:p>
+        </p:txBody>
+      </p:sp>
+      <p:sp>
+        <p:nvSpPr>
+          <p:cNvPr id="3" name="Text Placeholder 2"/>
+          <p:cNvSpPr>
+            <a:spLocks noGrp="1"/>
+          </p:cNvSpPr>
+          <p:nvPr>
+            <p:ph type="body" idx="1"/>
+          </p:nvPr>
+        </p:nvSpPr>
+        <p:spPr>
+          <a:xfrm>
+            <a:off x="252412" y="1352550"/>
+            <a:ext cx="8383588" cy="3790950"/>
+          </a:xfrm>
+        </p:spPr>
+        <p:txBody>
+          <a:bodyPr/>
+          <a:lstStyle/>
+          <a:p>
+            <a:r>
+              <a:rPr lang="en-ZA" dirty="0"/>
+              <a:t>Build scripts are Cake</a:t>
+            </a:r>
+          </a:p>
+          <a:p>
+            <a:pPr marL="0" lvl="1" indent="0">
+              <a:buNone/>
+            </a:pPr>
+            <a:r>
+              <a:rPr lang="en-ZA" dirty="0"/>
+              <a:t>	– support for complex scenarios</a:t>
+            </a:r>
+            <a:endParaRPr lang="en-ZA" dirty="0"/>
+          </a:p>
+          <a:p>
+            <a:pPr marL="0" lvl="1" indent="0">
+              <a:buNone/>
+            </a:pPr>
+            <a:r>
+              <a:rPr lang="en-ZA" dirty="0"/>
+              <a:t>	– C# code is great for developers</a:t>
+            </a:r>
+          </a:p>
+          <a:p>
+            <a:pPr marL="0" lvl="1" indent="0">
+              <a:buNone/>
+            </a:pPr>
+            <a:r>
+              <a:rPr lang="en-ZA" dirty="0"/>
+              <a:t>	– cross-platform build script using .NET</a:t>
+            </a:r>
+          </a:p>
+          <a:p>
+            <a:r>
+              <a:rPr lang="en-ZA" dirty="0"/>
+              <a:t>Tests are </a:t>
+            </a:r>
+            <a:r>
+              <a:rPr lang="en-ZA" dirty="0" err="1"/>
+              <a:t>NUnit</a:t>
+            </a:r>
+            <a:endParaRPr lang="en-ZA" dirty="0"/>
+          </a:p>
+          <a:p>
+            <a:pPr marL="0" lvl="1" indent="0">
+              <a:buNone/>
+            </a:pPr>
+            <a:r>
+              <a:rPr lang="en-ZA" dirty="0"/>
+              <a:t>	– cross-platform testing</a:t>
+            </a:r>
+          </a:p>
+          <a:p>
+            <a:pPr marL="0" lvl="1" indent="0">
+              <a:buNone/>
+            </a:pPr>
+            <a:r>
+              <a:rPr lang="en-ZA" dirty="0"/>
+              <a:t>	– easy to use with CLI</a:t>
+            </a:r>
+          </a:p>
+          <a:p>
+            <a:r>
+              <a:rPr lang="en-ZA" dirty="0"/>
+              <a:t>PCL is generated, not coded</a:t>
+            </a:r>
+          </a:p>
+          <a:p>
+            <a:pPr marL="0" lvl="1" indent="0">
+              <a:buNone/>
+            </a:pPr>
+            <a:r>
+              <a:rPr lang="en-ZA" dirty="0"/>
+              <a:t>	– no need for messy #if</a:t>
+            </a:r>
+          </a:p>
+          <a:p>
+            <a:pPr marL="0" lvl="1" indent="0">
+              <a:buNone/>
+            </a:pPr>
+            <a:r>
+              <a:rPr lang="en-ZA" dirty="0"/>
+              <a:t>	– no need to keep in sync</a:t>
+            </a:r>
+          </a:p>
+        </p:txBody>
+      </p:sp>
+    </p:spTree>
+    <p:extLst>
+      <p:ext uri="{BB962C8B-B14F-4D97-AF65-F5344CB8AC3E}">
+        <p14:creationId xmlns:p14="http://schemas.microsoft.com/office/powerpoint/2010/main" val="2499468591"/>
+      </p:ext>
+    </p:extLst>
+  </p:cSld>
+  <p:clrMapOvr>
+    <a:masterClrMapping/>
+  </p:clrMapOvr>
+  <p:transition spd="slow">
+    <p:cover/>
+  </p:transition>
+</p:sld>
+</file>
+
+<file path=ppt/slides/slide16.xml><?xml version="1.0" encoding="utf-8"?>
+<p:sld xmlns:a="http://schemas.openxmlformats.org/drawingml/2006/main" xmlns:r="http://schemas.openxmlformats.org/officeDocument/2006/relationships" xmlns:p="http://schemas.openxmlformats.org/presentationml/2006/main">
+  <p:cSld>
+    <p:spTree>
+      <p:nvGrpSpPr>
+        <p:cNvPr id="1" name=""/>
+        <p:cNvGrpSpPr/>
+        <p:nvPr/>
+      </p:nvGrpSpPr>
+      <p:grpSpPr>
+        <a:xfrm>
+          <a:off x="0" y="0"/>
+          <a:ext cx="0" cy="0"/>
+          <a:chOff x="0" y="0"/>
+          <a:chExt cx="0" cy="0"/>
+        </a:xfrm>
+      </p:grpSpPr>
+      <p:sp>
+        <p:nvSpPr>
+          <p:cNvPr id="3" name="Text Placeholder 2"/>
+          <p:cNvSpPr>
+            <a:spLocks noGrp="1"/>
+          </p:cNvSpPr>
+          <p:nvPr>
+            <p:ph type="body" idx="1"/>
+          </p:nvPr>
+        </p:nvSpPr>
+        <p:spPr/>
+        <p:txBody>
+          <a:bodyPr/>
+          <a:lstStyle/>
+          <a:p>
+            <a:r>
+              <a:rPr lang="en-US" dirty="0"/>
+              <a:t>Conclusions</a:t>
+            </a:r>
+          </a:p>
+        </p:txBody>
+      </p:sp>
+    </p:spTree>
+    <p:extLst>
+      <p:ext uri="{BB962C8B-B14F-4D97-AF65-F5344CB8AC3E}">
+        <p14:creationId xmlns:p14="http://schemas.microsoft.com/office/powerpoint/2010/main" val="1185255620"/>
+      </p:ext>
+    </p:extLst>
+  </p:cSld>
+  <p:clrMapOvr>
+    <a:masterClrMapping/>
+  </p:clrMapOvr>
+  <p:transition spd="slow">
+    <p:cover/>
+  </p:transition>
+</p:sld>
+</file>
+
+<file path=ppt/slides/slide17.xml><?xml version="1.0" encoding="utf-8"?>
+<p:sld xmlns:a="http://schemas.openxmlformats.org/drawingml/2006/main" xmlns:r="http://schemas.openxmlformats.org/officeDocument/2006/relationships" xmlns:p="http://schemas.openxmlformats.org/presentationml/2006/main">
+  <p:cSld>
+    <p:spTree>
+      <p:nvGrpSpPr>
+        <p:cNvPr id="1" name=""/>
+        <p:cNvGrpSpPr/>
+        <p:nvPr/>
+      </p:nvGrpSpPr>
+      <p:grpSpPr>
+        <a:xfrm>
+          <a:off x="0" y="0"/>
+          <a:ext cx="0" cy="0"/>
+          <a:chOff x="0" y="0"/>
+          <a:chExt cx="0" cy="0"/>
+        </a:xfrm>
+      </p:grpSpPr>
+      <p:sp>
+        <p:nvSpPr>
+          <p:cNvPr id="2" name="Title 1"/>
+          <p:cNvSpPr>
+            <a:spLocks noGrp="1"/>
+          </p:cNvSpPr>
+          <p:nvPr>
+            <p:ph type="title"/>
+          </p:nvPr>
+        </p:nvSpPr>
+        <p:spPr/>
+        <p:txBody>
+          <a:bodyPr/>
+          <a:lstStyle/>
+          <a:p>
+            <a:r>
+              <a:rPr lang="en-ZA" dirty="0"/>
               <a:t>Links</a:t>
             </a:r>
           </a:p>
@@ -4243,9 +4721,6 @@
               <a:rPr lang="en-ZA" dirty="0"/>
               <a:t>http://skia.org/</a:t>
             </a:r>
-            <a:br>
-              <a:rPr lang="en-ZA" dirty="0"/>
-            </a:br>
             <a:endParaRPr lang="en-ZA" dirty="0"/>
           </a:p>
           <a:p>
@@ -4258,14 +4733,55 @@
             </a:br>
             <a:r>
               <a:rPr lang="en-ZA" dirty="0"/>
-              <a:t>https://github.com/mono/SkiaSharp</a:t>
-            </a:r>
-            <a:r>
-              <a:rPr lang="en-ZA" dirty="0"/>
-              <a:t>/</a:t>
-            </a:r>
-          </a:p>
-          <a:p>
+              <a:t>https://github.com/mono/SkiaSharp/</a:t>
+            </a:r>
+          </a:p>
+          <a:p>
+            <a:r>
+              <a:rPr lang="en-ZA" b="1" dirty="0" err="1"/>
+              <a:t>monodoc</a:t>
+            </a:r>
+            <a:r>
+              <a:rPr lang="en-ZA" b="1" dirty="0"/>
+              <a:t> on GitHub</a:t>
+            </a:r>
+            <a:br>
+              <a:rPr lang="en-ZA" dirty="0"/>
+            </a:br>
+            <a:r>
+              <a:rPr lang="en-ZA" dirty="0"/>
+              <a:t>https://github.com/mono/api-doc-tools/</a:t>
+            </a:r>
+          </a:p>
+          <a:p>
+            <a:r>
+              <a:rPr lang="en-ZA" b="1" dirty="0"/>
+              <a:t>Cake (C# Make)</a:t>
+            </a:r>
+            <a:br>
+              <a:rPr lang="en-ZA" b="1" dirty="0"/>
+            </a:br>
+            <a:r>
+              <a:rPr lang="en-ZA" dirty="0"/>
+              <a:t>http://cakebuild.net/</a:t>
+            </a:r>
+          </a:p>
+          <a:p>
+            <a:r>
+              <a:rPr lang="en-ZA" b="1" dirty="0" err="1"/>
+              <a:t>GenAPI</a:t>
+            </a:r>
+            <a:r>
+              <a:rPr lang="en-ZA" b="1" dirty="0"/>
+              <a:t> on NuGet</a:t>
+            </a:r>
+            <a:br>
+              <a:rPr lang="en-ZA" dirty="0"/>
+            </a:br>
+            <a:r>
+              <a:rPr lang="en-ZA" dirty="0"/>
+              <a:t>http://nuget.org/packages/Microsoft.DotNet.BuildTools.GenAPI</a:t>
+            </a:r>
             <a:endParaRPr lang="en-ZA" dirty="0"/>
           </a:p>
         </p:txBody>
@@ -4660,7 +5176,6 @@
               <a:rPr lang="en-ZA" dirty="0"/>
               <a:t>Written in C++</a:t>
             </a:r>
-            <a:endParaRPr lang="en-ZA" dirty="0"/>
           </a:p>
           <a:p>
             <a:pPr marL="0" lvl="3" indent="0">
@@ -4685,7 +5200,6 @@
               <a:rPr lang="en-ZA" dirty="0"/>
               <a:t>Fully cross-platform</a:t>
             </a:r>
-            <a:endParaRPr lang="en-ZA" dirty="0"/>
           </a:p>
           <a:p>
             <a:pPr marL="0" indent="0">
@@ -4695,7 +5209,6 @@
               <a:rPr lang="en-ZA" dirty="0"/>
               <a:t>	– Windows, Mac, iOS, Android</a:t>
             </a:r>
-            <a:endParaRPr lang="en-ZA" dirty="0"/>
           </a:p>
           <a:p>
             <a:r>
@@ -4743,7 +5256,6 @@
               <a:rPr lang="en-ZA" dirty="0"/>
               <a:t>	– image formats (PNG/JPG/DNG/BMP)</a:t>
             </a:r>
-            <a:endParaRPr lang="en-ZA" dirty="0"/>
           </a:p>
           <a:p>
             <a:endParaRPr lang="en-ZA" dirty="0"/>
@@ -4967,7 +5479,6 @@
               <a:rPr lang="en-ZA" dirty="0"/>
               <a:t>Written in 100% shared C(++)</a:t>
             </a:r>
-            <a:endParaRPr lang="en-ZA" dirty="0"/>
           </a:p>
           <a:p>
             <a:r>
@@ -5199,14 +5710,12 @@
               <a:rPr lang="en-ZA" dirty="0"/>
               <a:t>Written in 99.99% shared C#</a:t>
             </a:r>
-            <a:endParaRPr lang="en-ZA" dirty="0"/>
           </a:p>
           <a:p>
             <a:r>
               <a:rPr lang="en-ZA" dirty="0"/>
               <a:t>Fully cross-platform</a:t>
             </a:r>
-            <a:endParaRPr lang="en-ZA" dirty="0"/>
           </a:p>
           <a:p>
             <a:r>

</xml_diff>